<commit_message>
added text to 'Features used' slide added youtube link
</commit_message>
<xml_diff>
--- a/doc/Project Presentation - Ra 2017-03.pptx
+++ b/doc/Project Presentation - Ra 2017-03.pptx
@@ -206,7 +206,7 @@
           <a:p>
             <a:fld id="{34A4B345-081C-4B36-8A2B-252C2F6BF39C}" type="datetimeFigureOut">
               <a:rPr lang="en-US" smtClean="0"/>
-              <a:t>3/6/2017</a:t>
+              <a:t>3/7/2017</a:t>
             </a:fld>
             <a:endParaRPr lang="en-US"/>
           </a:p>
@@ -301,7 +301,6 @@
               <a:rPr lang="en-US"/>
               <a:t>Fifth level</a:t>
             </a:r>
-            <a:endParaRPr lang="en-US"/>
           </a:p>
         </p:txBody>
       </p:sp>
@@ -702,13 +701,8 @@
             </a:br>
             <a:r>
               <a:rPr lang="en-US" dirty="0"/>
-              <a:t>Available at: </a:t>
-            </a:r>
-            <a:r>
-              <a:rPr lang="en-US" dirty="0"/>
-              <a:t>http://snapper.rooms.cwal.net/games.html</a:t>
-            </a:r>
-            <a:endParaRPr lang="en-US" dirty="0"/>
+              <a:t>Available at: http://snapper.rooms.cwal.net/games.html</a:t>
+            </a:r>
           </a:p>
         </p:txBody>
       </p:sp>
@@ -885,7 +879,7 @@
           <a:noFill/>
           <a:extLst>
             <a:ext uri="{909E8E84-426E-40dd-AFC4-6F175D3DCCD1}">
-              <a14:hiddenFill xmlns="" xmlns:a14="http://schemas.microsoft.com/office/drawing/2010/main">
+              <a14:hiddenFill xmlns:a14="http://schemas.microsoft.com/office/drawing/2010/main" xmlns="">
                 <a:solidFill>
                   <a:srgbClr val="FFFFFF"/>
                 </a:solidFill>
@@ -945,7 +939,7 @@
             </a:ln>
             <a:extLst>
               <a:ext uri="{91240B29-F687-4f45-9708-019B960494DF}">
-                <a14:hiddenLine xmlns="" xmlns:a14="http://schemas.microsoft.com/office/drawing/2010/main" w="9525">
+                <a14:hiddenLine xmlns:a14="http://schemas.microsoft.com/office/drawing/2010/main" xmlns="" w="9525">
                   <a:solidFill>
                     <a:srgbClr val="000000"/>
                   </a:solidFill>
@@ -1035,7 +1029,7 @@
             </a:ln>
             <a:extLst>
               <a:ext uri="{91240B29-F687-4f45-9708-019B960494DF}">
-                <a14:hiddenLine xmlns="" xmlns:a14="http://schemas.microsoft.com/office/drawing/2010/main" w="9525">
+                <a14:hiddenLine xmlns:a14="http://schemas.microsoft.com/office/drawing/2010/main" xmlns="" w="9525">
                   <a:solidFill>
                     <a:srgbClr val="000000"/>
                   </a:solidFill>
@@ -1125,7 +1119,7 @@
             </a:ln>
             <a:extLst>
               <a:ext uri="{91240B29-F687-4f45-9708-019B960494DF}">
-                <a14:hiddenLine xmlns="" xmlns:a14="http://schemas.microsoft.com/office/drawing/2010/main" w="9525">
+                <a14:hiddenLine xmlns:a14="http://schemas.microsoft.com/office/drawing/2010/main" xmlns="" w="9525">
                   <a:solidFill>
                     <a:srgbClr val="000000"/>
                   </a:solidFill>
@@ -1159,7 +1153,7 @@
             </a:ln>
             <a:extLst>
               <a:ext uri="{91240B29-F687-4f45-9708-019B960494DF}">
-                <a14:hiddenLine xmlns="" xmlns:a14="http://schemas.microsoft.com/office/drawing/2010/main" w="9525">
+                <a14:hiddenLine xmlns:a14="http://schemas.microsoft.com/office/drawing/2010/main" xmlns="" w="9525">
                   <a:solidFill>
                     <a:srgbClr val="000000"/>
                   </a:solidFill>
@@ -1249,7 +1243,7 @@
             </a:ln>
             <a:extLst>
               <a:ext uri="{91240B29-F687-4f45-9708-019B960494DF}">
-                <a14:hiddenLine xmlns="" xmlns:a14="http://schemas.microsoft.com/office/drawing/2010/main" w="9525">
+                <a14:hiddenLine xmlns:a14="http://schemas.microsoft.com/office/drawing/2010/main" xmlns="" w="9525">
                   <a:solidFill>
                     <a:srgbClr val="000000"/>
                   </a:solidFill>
@@ -1311,7 +1305,7 @@
             </a:ln>
             <a:extLst>
               <a:ext uri="{91240B29-F687-4f45-9708-019B960494DF}">
-                <a14:hiddenLine xmlns="" xmlns:a14="http://schemas.microsoft.com/office/drawing/2010/main" w="9525">
+                <a14:hiddenLine xmlns:a14="http://schemas.microsoft.com/office/drawing/2010/main" xmlns="" w="9525">
                   <a:solidFill>
                     <a:srgbClr val="000000"/>
                   </a:solidFill>
@@ -1373,7 +1367,7 @@
             </a:ln>
             <a:extLst>
               <a:ext uri="{91240B29-F687-4f45-9708-019B960494DF}">
-                <a14:hiddenLine xmlns="" xmlns:a14="http://schemas.microsoft.com/office/drawing/2010/main" w="9525">
+                <a14:hiddenLine xmlns:a14="http://schemas.microsoft.com/office/drawing/2010/main" xmlns="" w="9525">
                   <a:solidFill>
                     <a:srgbClr val="000000"/>
                   </a:solidFill>
@@ -1463,7 +1457,7 @@
             </a:ln>
             <a:extLst>
               <a:ext uri="{91240B29-F687-4f45-9708-019B960494DF}">
-                <a14:hiddenLine xmlns="" xmlns:a14="http://schemas.microsoft.com/office/drawing/2010/main" w="9525">
+                <a14:hiddenLine xmlns:a14="http://schemas.microsoft.com/office/drawing/2010/main" xmlns="" w="9525">
                   <a:solidFill>
                     <a:srgbClr val="000000"/>
                   </a:solidFill>
@@ -1525,7 +1519,7 @@
             </a:ln>
             <a:extLst>
               <a:ext uri="{91240B29-F687-4f45-9708-019B960494DF}">
-                <a14:hiddenLine xmlns="" xmlns:a14="http://schemas.microsoft.com/office/drawing/2010/main" w="9525">
+                <a14:hiddenLine xmlns:a14="http://schemas.microsoft.com/office/drawing/2010/main" xmlns="" w="9525">
                   <a:solidFill>
                     <a:srgbClr val="000000"/>
                   </a:solidFill>
@@ -1587,7 +1581,7 @@
             </a:ln>
             <a:extLst>
               <a:ext uri="{91240B29-F687-4f45-9708-019B960494DF}">
-                <a14:hiddenLine xmlns="" xmlns:a14="http://schemas.microsoft.com/office/drawing/2010/main" w="9525">
+                <a14:hiddenLine xmlns:a14="http://schemas.microsoft.com/office/drawing/2010/main" xmlns="" w="9525">
                   <a:solidFill>
                     <a:srgbClr val="000000"/>
                   </a:solidFill>
@@ -1677,7 +1671,7 @@
             </a:ln>
             <a:extLst>
               <a:ext uri="{91240B29-F687-4f45-9708-019B960494DF}">
-                <a14:hiddenLine xmlns="" xmlns:a14="http://schemas.microsoft.com/office/drawing/2010/main" w="9525">
+                <a14:hiddenLine xmlns:a14="http://schemas.microsoft.com/office/drawing/2010/main" xmlns="" w="9525">
                   <a:solidFill>
                     <a:srgbClr val="000000"/>
                   </a:solidFill>
@@ -1767,7 +1761,7 @@
             </a:ln>
             <a:extLst>
               <a:ext uri="{91240B29-F687-4f45-9708-019B960494DF}">
-                <a14:hiddenLine xmlns="" xmlns:a14="http://schemas.microsoft.com/office/drawing/2010/main" w="9525">
+                <a14:hiddenLine xmlns:a14="http://schemas.microsoft.com/office/drawing/2010/main" xmlns="" w="9525">
                   <a:solidFill>
                     <a:srgbClr val="000000"/>
                   </a:solidFill>
@@ -1829,7 +1823,7 @@
             </a:ln>
             <a:extLst>
               <a:ext uri="{91240B29-F687-4f45-9708-019B960494DF}">
-                <a14:hiddenLine xmlns="" xmlns:a14="http://schemas.microsoft.com/office/drawing/2010/main" w="9525">
+                <a14:hiddenLine xmlns:a14="http://schemas.microsoft.com/office/drawing/2010/main" xmlns="" w="9525">
                   <a:solidFill>
                     <a:srgbClr val="000000"/>
                   </a:solidFill>
@@ -1939,7 +1933,7 @@
             </a:ln>
             <a:extLst>
               <a:ext uri="{91240B29-F687-4f45-9708-019B960494DF}">
-                <a14:hiddenLine xmlns="" xmlns:a14="http://schemas.microsoft.com/office/drawing/2010/main" w="9525">
+                <a14:hiddenLine xmlns:a14="http://schemas.microsoft.com/office/drawing/2010/main" xmlns="" w="9525">
                   <a:solidFill>
                     <a:srgbClr val="000000"/>
                   </a:solidFill>
@@ -2001,7 +1995,7 @@
             </a:ln>
             <a:extLst>
               <a:ext uri="{91240B29-F687-4f45-9708-019B960494DF}">
-                <a14:hiddenLine xmlns="" xmlns:a14="http://schemas.microsoft.com/office/drawing/2010/main" w="9525">
+                <a14:hiddenLine xmlns:a14="http://schemas.microsoft.com/office/drawing/2010/main" xmlns="" w="9525">
                   <a:solidFill>
                     <a:srgbClr val="000000"/>
                   </a:solidFill>
@@ -2091,7 +2085,7 @@
             </a:ln>
             <a:extLst>
               <a:ext uri="{91240B29-F687-4f45-9708-019B960494DF}">
-                <a14:hiddenLine xmlns="" xmlns:a14="http://schemas.microsoft.com/office/drawing/2010/main" w="9525">
+                <a14:hiddenLine xmlns:a14="http://schemas.microsoft.com/office/drawing/2010/main" xmlns="" w="9525">
                   <a:solidFill>
                     <a:srgbClr val="000000"/>
                   </a:solidFill>
@@ -2181,7 +2175,7 @@
             </a:ln>
             <a:extLst>
               <a:ext uri="{91240B29-F687-4f45-9708-019B960494DF}">
-                <a14:hiddenLine xmlns="" xmlns:a14="http://schemas.microsoft.com/office/drawing/2010/main" w="9525">
+                <a14:hiddenLine xmlns:a14="http://schemas.microsoft.com/office/drawing/2010/main" xmlns="" w="9525">
                   <a:solidFill>
                     <a:srgbClr val="000000"/>
                   </a:solidFill>
@@ -2243,7 +2237,7 @@
             </a:ln>
             <a:extLst>
               <a:ext uri="{91240B29-F687-4f45-9708-019B960494DF}">
-                <a14:hiddenLine xmlns="" xmlns:a14="http://schemas.microsoft.com/office/drawing/2010/main" w="9525">
+                <a14:hiddenLine xmlns:a14="http://schemas.microsoft.com/office/drawing/2010/main" xmlns="" w="9525">
                   <a:solidFill>
                     <a:srgbClr val="000000"/>
                   </a:solidFill>
@@ -2333,7 +2327,7 @@
             </a:ln>
             <a:extLst>
               <a:ext uri="{91240B29-F687-4f45-9708-019B960494DF}">
-                <a14:hiddenLine xmlns="" xmlns:a14="http://schemas.microsoft.com/office/drawing/2010/main" w="9525">
+                <a14:hiddenLine xmlns:a14="http://schemas.microsoft.com/office/drawing/2010/main" xmlns="" w="9525">
                   <a:solidFill>
                     <a:srgbClr val="000000"/>
                   </a:solidFill>
@@ -2423,7 +2417,7 @@
             </a:ln>
             <a:extLst>
               <a:ext uri="{91240B29-F687-4f45-9708-019B960494DF}">
-                <a14:hiddenLine xmlns="" xmlns:a14="http://schemas.microsoft.com/office/drawing/2010/main" w="9525">
+                <a14:hiddenLine xmlns:a14="http://schemas.microsoft.com/office/drawing/2010/main" xmlns="" w="9525">
                   <a:solidFill>
                     <a:srgbClr val="000000"/>
                   </a:solidFill>
@@ -2479,7 +2473,7 @@
             </a:ln>
             <a:extLst>
               <a:ext uri="{91240B29-F687-4f45-9708-019B960494DF}">
-                <a14:hiddenLine xmlns="" xmlns:a14="http://schemas.microsoft.com/office/drawing/2010/main" w="9525">
+                <a14:hiddenLine xmlns:a14="http://schemas.microsoft.com/office/drawing/2010/main" xmlns="" w="9525">
                   <a:solidFill>
                     <a:srgbClr val="000000"/>
                   </a:solidFill>
@@ -2569,7 +2563,7 @@
             </a:ln>
             <a:extLst>
               <a:ext uri="{91240B29-F687-4f45-9708-019B960494DF}">
-                <a14:hiddenLine xmlns="" xmlns:a14="http://schemas.microsoft.com/office/drawing/2010/main" w="9525">
+                <a14:hiddenLine xmlns:a14="http://schemas.microsoft.com/office/drawing/2010/main" xmlns="" w="9525">
                   <a:solidFill>
                     <a:srgbClr val="000000"/>
                   </a:solidFill>
@@ -2625,7 +2619,7 @@
             </a:ln>
             <a:extLst>
               <a:ext uri="{91240B29-F687-4f45-9708-019B960494DF}">
-                <a14:hiddenLine xmlns="" xmlns:a14="http://schemas.microsoft.com/office/drawing/2010/main" w="9525">
+                <a14:hiddenLine xmlns:a14="http://schemas.microsoft.com/office/drawing/2010/main" xmlns="" w="9525">
                   <a:solidFill>
                     <a:srgbClr val="000000"/>
                   </a:solidFill>
@@ -2715,7 +2709,7 @@
             </a:ln>
             <a:extLst>
               <a:ext uri="{91240B29-F687-4f45-9708-019B960494DF}">
-                <a14:hiddenLine xmlns="" xmlns:a14="http://schemas.microsoft.com/office/drawing/2010/main" w="9525">
+                <a14:hiddenLine xmlns:a14="http://schemas.microsoft.com/office/drawing/2010/main" xmlns="" w="9525">
                   <a:solidFill>
                     <a:srgbClr val="000000"/>
                   </a:solidFill>
@@ -2783,7 +2777,7 @@
             </a:ln>
             <a:extLst>
               <a:ext uri="{91240B29-F687-4f45-9708-019B960494DF}">
-                <a14:hiddenLine xmlns="" xmlns:a14="http://schemas.microsoft.com/office/drawing/2010/main" w="9525">
+                <a14:hiddenLine xmlns:a14="http://schemas.microsoft.com/office/drawing/2010/main" xmlns="" w="9525">
                   <a:solidFill>
                     <a:srgbClr val="000000"/>
                   </a:solidFill>
@@ -2873,7 +2867,7 @@
             </a:ln>
             <a:extLst>
               <a:ext uri="{91240B29-F687-4f45-9708-019B960494DF}">
-                <a14:hiddenLine xmlns="" xmlns:a14="http://schemas.microsoft.com/office/drawing/2010/main" w="9525">
+                <a14:hiddenLine xmlns:a14="http://schemas.microsoft.com/office/drawing/2010/main" xmlns="" w="9525">
                   <a:solidFill>
                     <a:srgbClr val="000000"/>
                   </a:solidFill>
@@ -2941,7 +2935,7 @@
             </a:ln>
             <a:extLst>
               <a:ext uri="{91240B29-F687-4f45-9708-019B960494DF}">
-                <a14:hiddenLine xmlns="" xmlns:a14="http://schemas.microsoft.com/office/drawing/2010/main" w="9525">
+                <a14:hiddenLine xmlns:a14="http://schemas.microsoft.com/office/drawing/2010/main" xmlns="" w="9525">
                   <a:solidFill>
                     <a:srgbClr val="000000"/>
                   </a:solidFill>
@@ -3031,7 +3025,7 @@
             </a:ln>
             <a:extLst>
               <a:ext uri="{91240B29-F687-4f45-9708-019B960494DF}">
-                <a14:hiddenLine xmlns="" xmlns:a14="http://schemas.microsoft.com/office/drawing/2010/main" w="9525">
+                <a14:hiddenLine xmlns:a14="http://schemas.microsoft.com/office/drawing/2010/main" xmlns="" w="9525">
                   <a:solidFill>
                     <a:srgbClr val="000000"/>
                   </a:solidFill>
@@ -3065,7 +3059,7 @@
             </a:ln>
             <a:extLst>
               <a:ext uri="{91240B29-F687-4f45-9708-019B960494DF}">
-                <a14:hiddenLine xmlns="" xmlns:a14="http://schemas.microsoft.com/office/drawing/2010/main" w="9525">
+                <a14:hiddenLine xmlns:a14="http://schemas.microsoft.com/office/drawing/2010/main" xmlns="" w="9525">
                   <a:solidFill>
                     <a:srgbClr val="000000"/>
                   </a:solidFill>
@@ -3155,7 +3149,7 @@
             </a:ln>
             <a:extLst>
               <a:ext uri="{91240B29-F687-4f45-9708-019B960494DF}">
-                <a14:hiddenLine xmlns="" xmlns:a14="http://schemas.microsoft.com/office/drawing/2010/main" w="9525">
+                <a14:hiddenLine xmlns:a14="http://schemas.microsoft.com/office/drawing/2010/main" xmlns="" w="9525">
                   <a:solidFill>
                     <a:srgbClr val="000000"/>
                   </a:solidFill>
@@ -3217,7 +3211,7 @@
             </a:ln>
             <a:extLst>
               <a:ext uri="{91240B29-F687-4f45-9708-019B960494DF}">
-                <a14:hiddenLine xmlns="" xmlns:a14="http://schemas.microsoft.com/office/drawing/2010/main" w="9525">
+                <a14:hiddenLine xmlns:a14="http://schemas.microsoft.com/office/drawing/2010/main" xmlns="" w="9525">
                   <a:solidFill>
                     <a:srgbClr val="000000"/>
                   </a:solidFill>
@@ -3279,7 +3273,7 @@
             </a:ln>
             <a:extLst>
               <a:ext uri="{91240B29-F687-4f45-9708-019B960494DF}">
-                <a14:hiddenLine xmlns="" xmlns:a14="http://schemas.microsoft.com/office/drawing/2010/main" w="9525">
+                <a14:hiddenLine xmlns:a14="http://schemas.microsoft.com/office/drawing/2010/main" xmlns="" w="9525">
                   <a:solidFill>
                     <a:srgbClr val="000000"/>
                   </a:solidFill>
@@ -3369,7 +3363,7 @@
             </a:ln>
             <a:extLst>
               <a:ext uri="{91240B29-F687-4f45-9708-019B960494DF}">
-                <a14:hiddenLine xmlns="" xmlns:a14="http://schemas.microsoft.com/office/drawing/2010/main" w="9525">
+                <a14:hiddenLine xmlns:a14="http://schemas.microsoft.com/office/drawing/2010/main" xmlns="" w="9525">
                   <a:solidFill>
                     <a:srgbClr val="000000"/>
                   </a:solidFill>
@@ -3437,7 +3431,7 @@
             </a:ln>
             <a:extLst>
               <a:ext uri="{91240B29-F687-4f45-9708-019B960494DF}">
-                <a14:hiddenLine xmlns="" xmlns:a14="http://schemas.microsoft.com/office/drawing/2010/main" w="9525">
+                <a14:hiddenLine xmlns:a14="http://schemas.microsoft.com/office/drawing/2010/main" xmlns="" w="9525">
                   <a:solidFill>
                     <a:srgbClr val="000000"/>
                   </a:solidFill>
@@ -3499,7 +3493,7 @@
             </a:ln>
             <a:extLst>
               <a:ext uri="{91240B29-F687-4f45-9708-019B960494DF}">
-                <a14:hiddenLine xmlns="" xmlns:a14="http://schemas.microsoft.com/office/drawing/2010/main" w="9525">
+                <a14:hiddenLine xmlns:a14="http://schemas.microsoft.com/office/drawing/2010/main" xmlns="" w="9525">
                   <a:solidFill>
                     <a:srgbClr val="000000"/>
                   </a:solidFill>
@@ -3589,7 +3583,7 @@
             </a:ln>
             <a:extLst>
               <a:ext uri="{91240B29-F687-4f45-9708-019B960494DF}">
-                <a14:hiddenLine xmlns="" xmlns:a14="http://schemas.microsoft.com/office/drawing/2010/main" w="9525">
+                <a14:hiddenLine xmlns:a14="http://schemas.microsoft.com/office/drawing/2010/main" xmlns="" w="9525">
                   <a:solidFill>
                     <a:srgbClr val="000000"/>
                   </a:solidFill>
@@ -3651,7 +3645,7 @@
             </a:ln>
             <a:extLst>
               <a:ext uri="{91240B29-F687-4f45-9708-019B960494DF}">
-                <a14:hiddenLine xmlns="" xmlns:a14="http://schemas.microsoft.com/office/drawing/2010/main" w="9525">
+                <a14:hiddenLine xmlns:a14="http://schemas.microsoft.com/office/drawing/2010/main" xmlns="" w="9525">
                   <a:solidFill>
                     <a:srgbClr val="000000"/>
                   </a:solidFill>
@@ -3741,7 +3735,7 @@
             </a:ln>
             <a:extLst>
               <a:ext uri="{91240B29-F687-4f45-9708-019B960494DF}">
-                <a14:hiddenLine xmlns="" xmlns:a14="http://schemas.microsoft.com/office/drawing/2010/main" w="9525">
+                <a14:hiddenLine xmlns:a14="http://schemas.microsoft.com/office/drawing/2010/main" xmlns="" w="9525">
                   <a:solidFill>
                     <a:srgbClr val="000000"/>
                   </a:solidFill>
@@ -3803,7 +3797,7 @@
             </a:ln>
             <a:extLst>
               <a:ext uri="{91240B29-F687-4f45-9708-019B960494DF}">
-                <a14:hiddenLine xmlns="" xmlns:a14="http://schemas.microsoft.com/office/drawing/2010/main" w="9525">
+                <a14:hiddenLine xmlns:a14="http://schemas.microsoft.com/office/drawing/2010/main" xmlns="" w="9525">
                   <a:solidFill>
                     <a:srgbClr val="000000"/>
                   </a:solidFill>
@@ -3893,7 +3887,7 @@
             </a:ln>
             <a:extLst>
               <a:ext uri="{91240B29-F687-4f45-9708-019B960494DF}">
-                <a14:hiddenLine xmlns="" xmlns:a14="http://schemas.microsoft.com/office/drawing/2010/main" w="9525">
+                <a14:hiddenLine xmlns:a14="http://schemas.microsoft.com/office/drawing/2010/main" xmlns="" w="9525">
                   <a:solidFill>
                     <a:srgbClr val="000000"/>
                   </a:solidFill>
@@ -3927,7 +3921,7 @@
             </a:ln>
             <a:extLst>
               <a:ext uri="{91240B29-F687-4f45-9708-019B960494DF}">
-                <a14:hiddenLine xmlns="" xmlns:a14="http://schemas.microsoft.com/office/drawing/2010/main" w="9525">
+                <a14:hiddenLine xmlns:a14="http://schemas.microsoft.com/office/drawing/2010/main" xmlns="" w="9525">
                   <a:solidFill>
                     <a:srgbClr val="000000"/>
                   </a:solidFill>
@@ -3992,7 +3986,7 @@
             </a:ln>
             <a:extLst>
               <a:ext uri="{91240B29-F687-4f45-9708-019B960494DF}">
-                <a14:hiddenLine xmlns="" xmlns:a14="http://schemas.microsoft.com/office/drawing/2010/main" w="9525">
+                <a14:hiddenLine xmlns:a14="http://schemas.microsoft.com/office/drawing/2010/main" xmlns="" w="9525">
                   <a:solidFill>
                     <a:srgbClr val="000000"/>
                   </a:solidFill>
@@ -4082,7 +4076,7 @@
             </a:ln>
             <a:extLst>
               <a:ext uri="{91240B29-F687-4f45-9708-019B960494DF}">
-                <a14:hiddenLine xmlns="" xmlns:a14="http://schemas.microsoft.com/office/drawing/2010/main" w="9525">
+                <a14:hiddenLine xmlns:a14="http://schemas.microsoft.com/office/drawing/2010/main" xmlns="" w="9525">
                   <a:solidFill>
                     <a:srgbClr val="000000"/>
                   </a:solidFill>
@@ -4144,7 +4138,7 @@
             </a:ln>
             <a:extLst>
               <a:ext uri="{91240B29-F687-4f45-9708-019B960494DF}">
-                <a14:hiddenLine xmlns="" xmlns:a14="http://schemas.microsoft.com/office/drawing/2010/main" w="9525">
+                <a14:hiddenLine xmlns:a14="http://schemas.microsoft.com/office/drawing/2010/main" xmlns="" w="9525">
                   <a:solidFill>
                     <a:srgbClr val="000000"/>
                   </a:solidFill>
@@ -4234,7 +4228,7 @@
             </a:ln>
             <a:extLst>
               <a:ext uri="{91240B29-F687-4f45-9708-019B960494DF}">
-                <a14:hiddenLine xmlns="" xmlns:a14="http://schemas.microsoft.com/office/drawing/2010/main" w="9525">
+                <a14:hiddenLine xmlns:a14="http://schemas.microsoft.com/office/drawing/2010/main" xmlns="" w="9525">
                   <a:solidFill>
                     <a:srgbClr val="000000"/>
                   </a:solidFill>
@@ -4324,7 +4318,7 @@
             </a:ln>
             <a:extLst>
               <a:ext uri="{91240B29-F687-4f45-9708-019B960494DF}">
-                <a14:hiddenLine xmlns="" xmlns:a14="http://schemas.microsoft.com/office/drawing/2010/main" w="9525">
+                <a14:hiddenLine xmlns:a14="http://schemas.microsoft.com/office/drawing/2010/main" xmlns="" w="9525">
                   <a:solidFill>
                     <a:srgbClr val="000000"/>
                   </a:solidFill>
@@ -4389,7 +4383,7 @@
             </a:ln>
             <a:extLst>
               <a:ext uri="{91240B29-F687-4f45-9708-019B960494DF}">
-                <a14:hiddenLine xmlns="" xmlns:a14="http://schemas.microsoft.com/office/drawing/2010/main" w="9525">
+                <a14:hiddenLine xmlns:a14="http://schemas.microsoft.com/office/drawing/2010/main" xmlns="" w="9525">
                   <a:solidFill>
                     <a:srgbClr val="000000"/>
                   </a:solidFill>
@@ -4451,7 +4445,7 @@
             </a:ln>
             <a:extLst>
               <a:ext uri="{91240B29-F687-4f45-9708-019B960494DF}">
-                <a14:hiddenLine xmlns="" xmlns:a14="http://schemas.microsoft.com/office/drawing/2010/main" w="9525">
+                <a14:hiddenLine xmlns:a14="http://schemas.microsoft.com/office/drawing/2010/main" xmlns="" w="9525">
                   <a:solidFill>
                     <a:srgbClr val="000000"/>
                   </a:solidFill>
@@ -4541,7 +4535,7 @@
             </a:ln>
             <a:extLst>
               <a:ext uri="{91240B29-F687-4f45-9708-019B960494DF}">
-                <a14:hiddenLine xmlns="" xmlns:a14="http://schemas.microsoft.com/office/drawing/2010/main" w="9525">
+                <a14:hiddenLine xmlns:a14="http://schemas.microsoft.com/office/drawing/2010/main" xmlns="" w="9525">
                   <a:solidFill>
                     <a:srgbClr val="000000"/>
                   </a:solidFill>
@@ -4631,7 +4625,7 @@
             </a:ln>
             <a:extLst>
               <a:ext uri="{91240B29-F687-4f45-9708-019B960494DF}">
-                <a14:hiddenLine xmlns="" xmlns:a14="http://schemas.microsoft.com/office/drawing/2010/main" w="9525">
+                <a14:hiddenLine xmlns:a14="http://schemas.microsoft.com/office/drawing/2010/main" xmlns="" w="9525">
                   <a:solidFill>
                     <a:srgbClr val="000000"/>
                   </a:solidFill>
@@ -4693,7 +4687,7 @@
             </a:ln>
             <a:extLst>
               <a:ext uri="{91240B29-F687-4f45-9708-019B960494DF}">
-                <a14:hiddenLine xmlns="" xmlns:a14="http://schemas.microsoft.com/office/drawing/2010/main" w="9525">
+                <a14:hiddenLine xmlns:a14="http://schemas.microsoft.com/office/drawing/2010/main" xmlns="" w="9525">
                   <a:solidFill>
                     <a:srgbClr val="000000"/>
                   </a:solidFill>
@@ -4813,7 +4807,7 @@
             </a:ln>
             <a:extLst>
               <a:ext uri="{91240B29-F687-4f45-9708-019B960494DF}">
-                <a14:hiddenLine xmlns="" xmlns:a14="http://schemas.microsoft.com/office/drawing/2010/main" w="9525">
+                <a14:hiddenLine xmlns:a14="http://schemas.microsoft.com/office/drawing/2010/main" xmlns="" w="9525">
                   <a:solidFill>
                     <a:srgbClr val="000000"/>
                   </a:solidFill>
@@ -4881,7 +4875,7 @@
             </a:ln>
             <a:extLst>
               <a:ext uri="{91240B29-F687-4f45-9708-019B960494DF}">
-                <a14:hiddenLine xmlns="" xmlns:a14="http://schemas.microsoft.com/office/drawing/2010/main" w="9525">
+                <a14:hiddenLine xmlns:a14="http://schemas.microsoft.com/office/drawing/2010/main" xmlns="" w="9525">
                   <a:solidFill>
                     <a:srgbClr val="000000"/>
                   </a:solidFill>
@@ -4971,7 +4965,7 @@
             </a:ln>
             <a:extLst>
               <a:ext uri="{91240B29-F687-4f45-9708-019B960494DF}">
-                <a14:hiddenLine xmlns="" xmlns:a14="http://schemas.microsoft.com/office/drawing/2010/main" w="9525">
+                <a14:hiddenLine xmlns:a14="http://schemas.microsoft.com/office/drawing/2010/main" xmlns="" w="9525">
                   <a:solidFill>
                     <a:srgbClr val="000000"/>
                   </a:solidFill>
@@ -5111,7 +5105,7 @@
           <a:p>
             <a:fld id="{48A87A34-81AB-432B-8DAE-1953F412C126}" type="datetimeFigureOut">
               <a:rPr lang="en-US" dirty="0"/>
-              <a:t>3/6/2017</a:t>
+              <a:t>3/7/2017</a:t>
             </a:fld>
             <a:endParaRPr lang="en-US" dirty="0"/>
           </a:p>
@@ -5373,7 +5367,7 @@
           <a:p>
             <a:fld id="{48A87A34-81AB-432B-8DAE-1953F412C126}" type="datetimeFigureOut">
               <a:rPr lang="en-US" dirty="0"/>
-              <a:t>3/6/2017</a:t>
+              <a:t>3/7/2017</a:t>
             </a:fld>
             <a:endParaRPr lang="en-US" dirty="0"/>
           </a:p>
@@ -5564,7 +5558,7 @@
           <a:p>
             <a:fld id="{48A87A34-81AB-432B-8DAE-1953F412C126}" type="datetimeFigureOut">
               <a:rPr lang="en-US" dirty="0"/>
-              <a:t>3/6/2017</a:t>
+              <a:t>3/7/2017</a:t>
             </a:fld>
             <a:endParaRPr lang="en-US" dirty="0"/>
           </a:p>
@@ -5822,7 +5816,7 @@
           <a:p>
             <a:fld id="{48A87A34-81AB-432B-8DAE-1953F412C126}" type="datetimeFigureOut">
               <a:rPr lang="en-US" dirty="0"/>
-              <a:t>3/6/2017</a:t>
+              <a:t>3/7/2017</a:t>
             </a:fld>
             <a:endParaRPr lang="en-US" dirty="0"/>
           </a:p>
@@ -6251,7 +6245,7 @@
           <a:p>
             <a:fld id="{48A87A34-81AB-432B-8DAE-1953F412C126}" type="datetimeFigureOut">
               <a:rPr lang="en-US" dirty="0"/>
-              <a:t>3/6/2017</a:t>
+              <a:t>3/7/2017</a:t>
             </a:fld>
             <a:endParaRPr lang="en-US" dirty="0"/>
           </a:p>
@@ -6792,7 +6786,7 @@
           <a:p>
             <a:fld id="{48A87A34-81AB-432B-8DAE-1953F412C126}" type="datetimeFigureOut">
               <a:rPr lang="en-US" dirty="0"/>
-              <a:t>3/6/2017</a:t>
+              <a:t>3/7/2017</a:t>
             </a:fld>
             <a:endParaRPr lang="en-US" dirty="0"/>
           </a:p>
@@ -7507,7 +7501,7 @@
           <a:p>
             <a:fld id="{48A87A34-81AB-432B-8DAE-1953F412C126}" type="datetimeFigureOut">
               <a:rPr lang="en-US" dirty="0"/>
-              <a:t>3/6/2017</a:t>
+              <a:t>3/7/2017</a:t>
             </a:fld>
             <a:endParaRPr lang="en-US" dirty="0"/>
           </a:p>
@@ -7672,7 +7666,7 @@
           <a:p>
             <a:fld id="{48A87A34-81AB-432B-8DAE-1953F412C126}" type="datetimeFigureOut">
               <a:rPr lang="en-US" dirty="0"/>
-              <a:t>3/6/2017</a:t>
+              <a:t>3/7/2017</a:t>
             </a:fld>
             <a:endParaRPr lang="en-US" dirty="0"/>
           </a:p>
@@ -7847,7 +7841,7 @@
           <a:p>
             <a:fld id="{48A87A34-81AB-432B-8DAE-1953F412C126}" type="datetimeFigureOut">
               <a:rPr lang="en-US" dirty="0"/>
-              <a:t>3/6/2017</a:t>
+              <a:t>3/7/2017</a:t>
             </a:fld>
             <a:endParaRPr lang="en-US" dirty="0"/>
           </a:p>
@@ -8012,7 +8006,7 @@
           <a:p>
             <a:fld id="{48A87A34-81AB-432B-8DAE-1953F412C126}" type="datetimeFigureOut">
               <a:rPr lang="en-US" dirty="0"/>
-              <a:t>3/6/2017</a:t>
+              <a:t>3/7/2017</a:t>
             </a:fld>
             <a:endParaRPr lang="en-US" dirty="0"/>
           </a:p>
@@ -8257,7 +8251,7 @@
           <a:p>
             <a:fld id="{48A87A34-81AB-432B-8DAE-1953F412C126}" type="datetimeFigureOut">
               <a:rPr lang="en-US" dirty="0"/>
-              <a:t>3/6/2017</a:t>
+              <a:t>3/7/2017</a:t>
             </a:fld>
             <a:endParaRPr lang="en-US" dirty="0"/>
           </a:p>
@@ -8484,7 +8478,7 @@
           <a:p>
             <a:fld id="{48A87A34-81AB-432B-8DAE-1953F412C126}" type="datetimeFigureOut">
               <a:rPr lang="en-US" dirty="0"/>
-              <a:t>3/6/2017</a:t>
+              <a:t>3/7/2017</a:t>
             </a:fld>
             <a:endParaRPr lang="en-US" dirty="0"/>
           </a:p>
@@ -8860,7 +8854,7 @@
           <a:p>
             <a:fld id="{48A87A34-81AB-432B-8DAE-1953F412C126}" type="datetimeFigureOut">
               <a:rPr lang="en-US" dirty="0"/>
-              <a:t>3/6/2017</a:t>
+              <a:t>3/7/2017</a:t>
             </a:fld>
             <a:endParaRPr lang="en-US" dirty="0"/>
           </a:p>
@@ -8973,7 +8967,7 @@
           <a:p>
             <a:fld id="{48A87A34-81AB-432B-8DAE-1953F412C126}" type="datetimeFigureOut">
               <a:rPr lang="en-US" dirty="0"/>
-              <a:t>3/6/2017</a:t>
+              <a:t>3/7/2017</a:t>
             </a:fld>
             <a:endParaRPr lang="en-US" dirty="0"/>
           </a:p>
@@ -9063,7 +9057,7 @@
           <a:p>
             <a:fld id="{48A87A34-81AB-432B-8DAE-1953F412C126}" type="datetimeFigureOut">
               <a:rPr lang="en-US" dirty="0"/>
-              <a:t>3/6/2017</a:t>
+              <a:t>3/7/2017</a:t>
             </a:fld>
             <a:endParaRPr lang="en-US" dirty="0"/>
           </a:p>
@@ -9307,7 +9301,7 @@
           <a:p>
             <a:fld id="{48A87A34-81AB-432B-8DAE-1953F412C126}" type="datetimeFigureOut">
               <a:rPr lang="en-US" dirty="0"/>
-              <a:t>3/6/2017</a:t>
+              <a:t>3/7/2017</a:t>
             </a:fld>
             <a:endParaRPr lang="en-US" dirty="0"/>
           </a:p>
@@ -9582,7 +9576,7 @@
           <a:p>
             <a:fld id="{48A87A34-81AB-432B-8DAE-1953F412C126}" type="datetimeFigureOut">
               <a:rPr lang="en-US" dirty="0"/>
-              <a:t>3/6/2017</a:t>
+              <a:t>3/7/2017</a:t>
             </a:fld>
             <a:endParaRPr lang="en-US" dirty="0"/>
           </a:p>
@@ -9693,7 +9687,7 @@
           <a:noFill/>
           <a:extLst>
             <a:ext uri="{909E8E84-426E-40dd-AFC4-6F175D3DCCD1}">
-              <a14:hiddenFill xmlns="" xmlns:a14="http://schemas.microsoft.com/office/drawing/2010/main">
+              <a14:hiddenFill xmlns:a14="http://schemas.microsoft.com/office/drawing/2010/main" xmlns="">
                 <a:solidFill>
                   <a:srgbClr val="FFFFFF"/>
                 </a:solidFill>
@@ -9767,7 +9761,7 @@
               </a:ln>
               <a:extLst>
                 <a:ext uri="{91240B29-F687-4f45-9708-019B960494DF}">
-                  <a14:hiddenLine xmlns="" xmlns:a14="http://schemas.microsoft.com/office/drawing/2010/main" w="9525">
+                  <a14:hiddenLine xmlns:a14="http://schemas.microsoft.com/office/drawing/2010/main" xmlns="" w="9525">
                     <a:solidFill>
                       <a:srgbClr val="000000"/>
                     </a:solidFill>
@@ -9857,7 +9851,7 @@
               </a:ln>
               <a:extLst>
                 <a:ext uri="{91240B29-F687-4f45-9708-019B960494DF}">
-                  <a14:hiddenLine xmlns="" xmlns:a14="http://schemas.microsoft.com/office/drawing/2010/main" w="9525">
+                  <a14:hiddenLine xmlns:a14="http://schemas.microsoft.com/office/drawing/2010/main" xmlns="" w="9525">
                     <a:solidFill>
                       <a:srgbClr val="000000"/>
                     </a:solidFill>
@@ -9947,7 +9941,7 @@
               </a:ln>
               <a:extLst>
                 <a:ext uri="{91240B29-F687-4f45-9708-019B960494DF}">
-                  <a14:hiddenLine xmlns="" xmlns:a14="http://schemas.microsoft.com/office/drawing/2010/main" w="9525">
+                  <a14:hiddenLine xmlns:a14="http://schemas.microsoft.com/office/drawing/2010/main" xmlns="" w="9525">
                     <a:solidFill>
                       <a:srgbClr val="000000"/>
                     </a:solidFill>
@@ -10009,7 +10003,7 @@
               </a:ln>
               <a:extLst>
                 <a:ext uri="{91240B29-F687-4f45-9708-019B960494DF}">
-                  <a14:hiddenLine xmlns="" xmlns:a14="http://schemas.microsoft.com/office/drawing/2010/main" w="9525">
+                  <a14:hiddenLine xmlns:a14="http://schemas.microsoft.com/office/drawing/2010/main" xmlns="" w="9525">
                     <a:solidFill>
                       <a:srgbClr val="000000"/>
                     </a:solidFill>
@@ -10099,7 +10093,7 @@
               </a:ln>
               <a:extLst>
                 <a:ext uri="{91240B29-F687-4f45-9708-019B960494DF}">
-                  <a14:hiddenLine xmlns="" xmlns:a14="http://schemas.microsoft.com/office/drawing/2010/main" w="9525">
+                  <a14:hiddenLine xmlns:a14="http://schemas.microsoft.com/office/drawing/2010/main" xmlns="" w="9525">
                     <a:solidFill>
                       <a:srgbClr val="000000"/>
                     </a:solidFill>
@@ -10161,7 +10155,7 @@
               </a:ln>
               <a:extLst>
                 <a:ext uri="{91240B29-F687-4f45-9708-019B960494DF}">
-                  <a14:hiddenLine xmlns="" xmlns:a14="http://schemas.microsoft.com/office/drawing/2010/main" w="9525">
+                  <a14:hiddenLine xmlns:a14="http://schemas.microsoft.com/office/drawing/2010/main" xmlns="" w="9525">
                     <a:solidFill>
                       <a:srgbClr val="000000"/>
                     </a:solidFill>
@@ -10223,7 +10217,7 @@
               </a:ln>
               <a:extLst>
                 <a:ext uri="{91240B29-F687-4f45-9708-019B960494DF}">
-                  <a14:hiddenLine xmlns="" xmlns:a14="http://schemas.microsoft.com/office/drawing/2010/main" w="9525">
+                  <a14:hiddenLine xmlns:a14="http://schemas.microsoft.com/office/drawing/2010/main" xmlns="" w="9525">
                     <a:solidFill>
                       <a:srgbClr val="000000"/>
                     </a:solidFill>
@@ -10313,7 +10307,7 @@
               </a:ln>
               <a:extLst>
                 <a:ext uri="{91240B29-F687-4f45-9708-019B960494DF}">
-                  <a14:hiddenLine xmlns="" xmlns:a14="http://schemas.microsoft.com/office/drawing/2010/main" w="9525">
+                  <a14:hiddenLine xmlns:a14="http://schemas.microsoft.com/office/drawing/2010/main" xmlns="" w="9525">
                     <a:solidFill>
                       <a:srgbClr val="000000"/>
                     </a:solidFill>
@@ -10403,7 +10397,7 @@
               </a:ln>
               <a:extLst>
                 <a:ext uri="{91240B29-F687-4f45-9708-019B960494DF}">
-                  <a14:hiddenLine xmlns="" xmlns:a14="http://schemas.microsoft.com/office/drawing/2010/main" w="9525">
+                  <a14:hiddenLine xmlns:a14="http://schemas.microsoft.com/office/drawing/2010/main" xmlns="" w="9525">
                     <a:solidFill>
                       <a:srgbClr val="000000"/>
                     </a:solidFill>
@@ -10465,7 +10459,7 @@
               </a:ln>
               <a:extLst>
                 <a:ext uri="{91240B29-F687-4f45-9708-019B960494DF}">
-                  <a14:hiddenLine xmlns="" xmlns:a14="http://schemas.microsoft.com/office/drawing/2010/main" w="9525">
+                  <a14:hiddenLine xmlns:a14="http://schemas.microsoft.com/office/drawing/2010/main" xmlns="" w="9525">
                     <a:solidFill>
                       <a:srgbClr val="000000"/>
                     </a:solidFill>
@@ -10575,7 +10569,7 @@
               </a:ln>
               <a:extLst>
                 <a:ext uri="{91240B29-F687-4f45-9708-019B960494DF}">
-                  <a14:hiddenLine xmlns="" xmlns:a14="http://schemas.microsoft.com/office/drawing/2010/main" w="9525">
+                  <a14:hiddenLine xmlns:a14="http://schemas.microsoft.com/office/drawing/2010/main" xmlns="" w="9525">
                     <a:solidFill>
                       <a:srgbClr val="000000"/>
                     </a:solidFill>
@@ -10659,7 +10653,7 @@
               </a:ln>
               <a:extLst>
                 <a:ext uri="{91240B29-F687-4f45-9708-019B960494DF}">
-                  <a14:hiddenLine xmlns="" xmlns:a14="http://schemas.microsoft.com/office/drawing/2010/main" w="9525">
+                  <a14:hiddenLine xmlns:a14="http://schemas.microsoft.com/office/drawing/2010/main" xmlns="" w="9525">
                     <a:solidFill>
                       <a:srgbClr val="000000"/>
                     </a:solidFill>
@@ -10721,7 +10715,7 @@
               </a:ln>
               <a:extLst>
                 <a:ext uri="{91240B29-F687-4f45-9708-019B960494DF}">
-                  <a14:hiddenLine xmlns="" xmlns:a14="http://schemas.microsoft.com/office/drawing/2010/main" w="9525">
+                  <a14:hiddenLine xmlns:a14="http://schemas.microsoft.com/office/drawing/2010/main" xmlns="" w="9525">
                     <a:solidFill>
                       <a:srgbClr val="000000"/>
                     </a:solidFill>
@@ -10783,7 +10777,7 @@
               </a:ln>
               <a:extLst>
                 <a:ext uri="{91240B29-F687-4f45-9708-019B960494DF}">
-                  <a14:hiddenLine xmlns="" xmlns:a14="http://schemas.microsoft.com/office/drawing/2010/main" w="9525">
+                  <a14:hiddenLine xmlns:a14="http://schemas.microsoft.com/office/drawing/2010/main" xmlns="" w="9525">
                     <a:solidFill>
                       <a:srgbClr val="000000"/>
                     </a:solidFill>
@@ -10873,7 +10867,7 @@
               </a:ln>
               <a:extLst>
                 <a:ext uri="{91240B29-F687-4f45-9708-019B960494DF}">
-                  <a14:hiddenLine xmlns="" xmlns:a14="http://schemas.microsoft.com/office/drawing/2010/main" w="9525">
+                  <a14:hiddenLine xmlns:a14="http://schemas.microsoft.com/office/drawing/2010/main" xmlns="" w="9525">
                     <a:solidFill>
                       <a:srgbClr val="000000"/>
                     </a:solidFill>
@@ -10907,7 +10901,7 @@
               </a:ln>
               <a:extLst>
                 <a:ext uri="{91240B29-F687-4f45-9708-019B960494DF}">
-                  <a14:hiddenLine xmlns="" xmlns:a14="http://schemas.microsoft.com/office/drawing/2010/main" w="9525">
+                  <a14:hiddenLine xmlns:a14="http://schemas.microsoft.com/office/drawing/2010/main" xmlns="" w="9525">
                     <a:solidFill>
                       <a:srgbClr val="000000"/>
                     </a:solidFill>
@@ -10972,7 +10966,7 @@
               </a:ln>
               <a:extLst>
                 <a:ext uri="{91240B29-F687-4f45-9708-019B960494DF}">
-                  <a14:hiddenLine xmlns="" xmlns:a14="http://schemas.microsoft.com/office/drawing/2010/main" w="9525">
+                  <a14:hiddenLine xmlns:a14="http://schemas.microsoft.com/office/drawing/2010/main" xmlns="" w="9525">
                     <a:solidFill>
                       <a:srgbClr val="000000"/>
                     </a:solidFill>
@@ -11062,7 +11056,7 @@
               </a:ln>
               <a:extLst>
                 <a:ext uri="{91240B29-F687-4f45-9708-019B960494DF}">
-                  <a14:hiddenLine xmlns="" xmlns:a14="http://schemas.microsoft.com/office/drawing/2010/main" w="9525">
+                  <a14:hiddenLine xmlns:a14="http://schemas.microsoft.com/office/drawing/2010/main" xmlns="" w="9525">
                     <a:solidFill>
                       <a:srgbClr val="000000"/>
                     </a:solidFill>
@@ -11124,7 +11118,7 @@
               </a:ln>
               <a:extLst>
                 <a:ext uri="{91240B29-F687-4f45-9708-019B960494DF}">
-                  <a14:hiddenLine xmlns="" xmlns:a14="http://schemas.microsoft.com/office/drawing/2010/main" w="9525">
+                  <a14:hiddenLine xmlns:a14="http://schemas.microsoft.com/office/drawing/2010/main" xmlns="" w="9525">
                     <a:solidFill>
                       <a:srgbClr val="000000"/>
                     </a:solidFill>
@@ -11214,7 +11208,7 @@
               </a:ln>
               <a:extLst>
                 <a:ext uri="{91240B29-F687-4f45-9708-019B960494DF}">
-                  <a14:hiddenLine xmlns="" xmlns:a14="http://schemas.microsoft.com/office/drawing/2010/main" w="9525">
+                  <a14:hiddenLine xmlns:a14="http://schemas.microsoft.com/office/drawing/2010/main" xmlns="" w="9525">
                     <a:solidFill>
                       <a:srgbClr val="000000"/>
                     </a:solidFill>
@@ -11279,7 +11273,7 @@
               </a:ln>
               <a:extLst>
                 <a:ext uri="{91240B29-F687-4f45-9708-019B960494DF}">
-                  <a14:hiddenLine xmlns="" xmlns:a14="http://schemas.microsoft.com/office/drawing/2010/main" w="9525">
+                  <a14:hiddenLine xmlns:a14="http://schemas.microsoft.com/office/drawing/2010/main" xmlns="" w="9525">
                     <a:solidFill>
                       <a:srgbClr val="000000"/>
                     </a:solidFill>
@@ -11341,7 +11335,7 @@
               </a:ln>
               <a:extLst>
                 <a:ext uri="{91240B29-F687-4f45-9708-019B960494DF}">
-                  <a14:hiddenLine xmlns="" xmlns:a14="http://schemas.microsoft.com/office/drawing/2010/main" w="9525">
+                  <a14:hiddenLine xmlns:a14="http://schemas.microsoft.com/office/drawing/2010/main" xmlns="" w="9525">
                     <a:solidFill>
                       <a:srgbClr val="000000"/>
                     </a:solidFill>
@@ -11431,7 +11425,7 @@
               </a:ln>
               <a:extLst>
                 <a:ext uri="{91240B29-F687-4f45-9708-019B960494DF}">
-                  <a14:hiddenLine xmlns="" xmlns:a14="http://schemas.microsoft.com/office/drawing/2010/main" w="9525">
+                  <a14:hiddenLine xmlns:a14="http://schemas.microsoft.com/office/drawing/2010/main" xmlns="" w="9525">
                     <a:solidFill>
                       <a:srgbClr val="000000"/>
                     </a:solidFill>
@@ -11521,7 +11515,7 @@
               </a:ln>
               <a:extLst>
                 <a:ext uri="{91240B29-F687-4f45-9708-019B960494DF}">
-                  <a14:hiddenLine xmlns="" xmlns:a14="http://schemas.microsoft.com/office/drawing/2010/main" w="9525">
+                  <a14:hiddenLine xmlns:a14="http://schemas.microsoft.com/office/drawing/2010/main" xmlns="" w="9525">
                     <a:solidFill>
                       <a:srgbClr val="000000"/>
                     </a:solidFill>
@@ -11586,7 +11580,7 @@
               </a:ln>
               <a:extLst>
                 <a:ext uri="{91240B29-F687-4f45-9708-019B960494DF}">
-                  <a14:hiddenLine xmlns="" xmlns:a14="http://schemas.microsoft.com/office/drawing/2010/main" w="9525">
+                  <a14:hiddenLine xmlns:a14="http://schemas.microsoft.com/office/drawing/2010/main" xmlns="" w="9525">
                     <a:solidFill>
                       <a:srgbClr val="000000"/>
                     </a:solidFill>
@@ -11706,7 +11700,7 @@
               </a:ln>
               <a:extLst>
                 <a:ext uri="{91240B29-F687-4f45-9708-019B960494DF}">
-                  <a14:hiddenLine xmlns="" xmlns:a14="http://schemas.microsoft.com/office/drawing/2010/main" w="9525">
+                  <a14:hiddenLine xmlns:a14="http://schemas.microsoft.com/office/drawing/2010/main" xmlns="" w="9525">
                     <a:solidFill>
                       <a:srgbClr val="000000"/>
                     </a:solidFill>
@@ -11804,7 +11798,7 @@
               </a:ln>
               <a:extLst>
                 <a:ext uri="{91240B29-F687-4f45-9708-019B960494DF}">
-                  <a14:hiddenLine xmlns="" xmlns:a14="http://schemas.microsoft.com/office/drawing/2010/main" w="9525">
+                  <a14:hiddenLine xmlns:a14="http://schemas.microsoft.com/office/drawing/2010/main" xmlns="" w="9525">
                     <a:solidFill>
                       <a:srgbClr val="000000"/>
                     </a:solidFill>
@@ -11919,7 +11913,7 @@
               </a:ln>
               <a:extLst>
                 <a:ext uri="{91240B29-F687-4f45-9708-019B960494DF}">
-                  <a14:hiddenLine xmlns="" xmlns:a14="http://schemas.microsoft.com/office/drawing/2010/main" w="9525">
+                  <a14:hiddenLine xmlns:a14="http://schemas.microsoft.com/office/drawing/2010/main" xmlns="" w="9525">
                     <a:solidFill>
                       <a:srgbClr val="000000"/>
                     </a:solidFill>
@@ -12009,7 +12003,7 @@
               </a:ln>
               <a:extLst>
                 <a:ext uri="{91240B29-F687-4f45-9708-019B960494DF}">
-                  <a14:hiddenLine xmlns="" xmlns:a14="http://schemas.microsoft.com/office/drawing/2010/main" w="9525">
+                  <a14:hiddenLine xmlns:a14="http://schemas.microsoft.com/office/drawing/2010/main" xmlns="" w="9525">
                     <a:solidFill>
                       <a:srgbClr val="000000"/>
                     </a:solidFill>
@@ -12074,7 +12068,7 @@
               </a:ln>
               <a:extLst>
                 <a:ext uri="{91240B29-F687-4f45-9708-019B960494DF}">
-                  <a14:hiddenLine xmlns="" xmlns:a14="http://schemas.microsoft.com/office/drawing/2010/main" w="9525">
+                  <a14:hiddenLine xmlns:a14="http://schemas.microsoft.com/office/drawing/2010/main" xmlns="" w="9525">
                     <a:solidFill>
                       <a:srgbClr val="000000"/>
                     </a:solidFill>
@@ -12164,7 +12158,7 @@
               </a:ln>
               <a:extLst>
                 <a:ext uri="{91240B29-F687-4f45-9708-019B960494DF}">
-                  <a14:hiddenLine xmlns="" xmlns:a14="http://schemas.microsoft.com/office/drawing/2010/main" w="9525">
+                  <a14:hiddenLine xmlns:a14="http://schemas.microsoft.com/office/drawing/2010/main" xmlns="" w="9525">
                     <a:solidFill>
                       <a:srgbClr val="000000"/>
                     </a:solidFill>
@@ -12232,7 +12226,7 @@
               </a:ln>
               <a:extLst>
                 <a:ext uri="{91240B29-F687-4f45-9708-019B960494DF}">
-                  <a14:hiddenLine xmlns="" xmlns:a14="http://schemas.microsoft.com/office/drawing/2010/main" w="9525">
+                  <a14:hiddenLine xmlns:a14="http://schemas.microsoft.com/office/drawing/2010/main" xmlns="" w="9525">
                     <a:solidFill>
                       <a:srgbClr val="000000"/>
                     </a:solidFill>
@@ -12322,7 +12316,7 @@
               </a:ln>
               <a:extLst>
                 <a:ext uri="{91240B29-F687-4f45-9708-019B960494DF}">
-                  <a14:hiddenLine xmlns="" xmlns:a14="http://schemas.microsoft.com/office/drawing/2010/main" w="9525">
+                  <a14:hiddenLine xmlns:a14="http://schemas.microsoft.com/office/drawing/2010/main" xmlns="" w="9525">
                     <a:solidFill>
                       <a:srgbClr val="000000"/>
                     </a:solidFill>
@@ -12390,7 +12384,7 @@
               </a:ln>
               <a:extLst>
                 <a:ext uri="{91240B29-F687-4f45-9708-019B960494DF}">
-                  <a14:hiddenLine xmlns="" xmlns:a14="http://schemas.microsoft.com/office/drawing/2010/main" w="9525">
+                  <a14:hiddenLine xmlns:a14="http://schemas.microsoft.com/office/drawing/2010/main" xmlns="" w="9525">
                     <a:solidFill>
                       <a:srgbClr val="000000"/>
                     </a:solidFill>
@@ -12480,7 +12474,7 @@
               </a:ln>
               <a:extLst>
                 <a:ext uri="{91240B29-F687-4f45-9708-019B960494DF}">
-                  <a14:hiddenLine xmlns="" xmlns:a14="http://schemas.microsoft.com/office/drawing/2010/main" w="9525">
+                  <a14:hiddenLine xmlns:a14="http://schemas.microsoft.com/office/drawing/2010/main" xmlns="" w="9525">
                     <a:solidFill>
                       <a:srgbClr val="000000"/>
                     </a:solidFill>
@@ -12514,7 +12508,7 @@
               </a:ln>
               <a:extLst>
                 <a:ext uri="{91240B29-F687-4f45-9708-019B960494DF}">
-                  <a14:hiddenLine xmlns="" xmlns:a14="http://schemas.microsoft.com/office/drawing/2010/main" w="9525">
+                  <a14:hiddenLine xmlns:a14="http://schemas.microsoft.com/office/drawing/2010/main" xmlns="" w="9525">
                     <a:solidFill>
                       <a:srgbClr val="000000"/>
                     </a:solidFill>
@@ -12655,7 +12649,7 @@
             <a:fld id="{48A87A34-81AB-432B-8DAE-1953F412C126}" type="datetimeFigureOut">
               <a:rPr lang="en-US" dirty="0"/>
               <a:pPr/>
-              <a:t>3/6/2017</a:t>
+              <a:t>3/7/2017</a:t>
             </a:fld>
             <a:endParaRPr lang="en-US" dirty="0"/>
           </a:p>
@@ -13270,7 +13264,7 @@
         <p:spPr/>
         <p:txBody>
           <a:bodyPr>
-            <a:normAutofit fontScale="92500" lnSpcReduction="20000"/>
+            <a:normAutofit fontScale="85000" lnSpcReduction="10000"/>
           </a:bodyPr>
           <a:lstStyle/>
           <a:p>
@@ -13332,6 +13326,23 @@
                 <a:hlinkClick r:id="rId4"/>
               </a:rPr>
               <a:t>https://github.com/brskl/Ra</a:t>
+            </a:r>
+            <a:endParaRPr lang="en-US" dirty="0"/>
+          </a:p>
+          <a:p>
+            <a:r>
+              <a:rPr lang="en-US" dirty="0"/>
+              <a:t>Video presentation: </a:t>
+            </a:r>
+            <a:r>
+              <a:rPr lang="en-US" dirty="0">
+                <a:hlinkClick r:id="rId5"/>
+              </a:rPr>
+              <a:t>https://youtu.be/n_CXcqok1U0</a:t>
+            </a:r>
+            <a:r>
+              <a:rPr lang="en-US" dirty="0"/>
+              <a:t> </a:t>
             </a:r>
             <a:endParaRPr lang="en-US" dirty="0"/>
           </a:p>
@@ -13813,7 +13824,6 @@
               <a:rPr lang="en-US"/>
               <a:t>V0.2</a:t>
             </a:r>
-            <a:endParaRPr lang="en-US"/>
           </a:p>
         </p:txBody>
       </p:sp>
@@ -13901,11 +13911,101 @@
         <p:spPr/>
         <p:txBody>
           <a:bodyPr>
-            <a:normAutofit/>
+            <a:normAutofit fontScale="85000" lnSpcReduction="20000"/>
           </a:bodyPr>
           <a:lstStyle/>
           <a:p>
+            <a:r>
+              <a:rPr lang="en-US" dirty="0"/>
+              <a:t>String resources: Plural, multiple languages</a:t>
+            </a:r>
+          </a:p>
+          <a:p>
+            <a:r>
+              <a:rPr lang="en-US" dirty="0"/>
+              <a:t>New launcher icon w/ multiple resolutions</a:t>
+            </a:r>
+          </a:p>
+          <a:p>
+            <a:r>
+              <a:rPr lang="en-US" i="1" dirty="0"/>
+              <a:t>Animation</a:t>
+            </a:r>
+            <a:r>
+              <a:rPr lang="en-US" dirty="0"/>
+              <a:t> class used on start-up activity</a:t>
+            </a:r>
+          </a:p>
+          <a:p>
+            <a:r>
+              <a:rPr lang="en-US" dirty="0"/>
+              <a:t>Multiple Layouts: portrait vs. landscape</a:t>
+            </a:r>
+          </a:p>
+          <a:p>
+            <a:r>
+              <a:rPr lang="en-US" dirty="0"/>
+              <a:t>‘Up’ navigation</a:t>
+            </a:r>
+          </a:p>
+          <a:p>
+            <a:r>
+              <a:rPr lang="en-US" dirty="0"/>
+              <a:t>Graphical images in </a:t>
+            </a:r>
+            <a:r>
+              <a:rPr lang="en-US" dirty="0" err="1"/>
+              <a:t>GameActivity</a:t>
+            </a:r>
+            <a:r>
+              <a:rPr lang="en-US" dirty="0"/>
+              <a:t>, </a:t>
+            </a:r>
+            <a:r>
+              <a:rPr lang="en-US" dirty="0" err="1"/>
+              <a:t>ScoreActivity</a:t>
+            </a:r>
+            <a:r>
+              <a:rPr lang="en-US" dirty="0"/>
+              <a:t>, </a:t>
+            </a:r>
+            <a:r>
+              <a:rPr lang="en-US" dirty="0" err="1"/>
+              <a:t>TilesActivity</a:t>
+            </a:r>
             <a:endParaRPr lang="en-US" dirty="0"/>
+          </a:p>
+          <a:p>
+            <a:r>
+              <a:rPr lang="en-US" dirty="0"/>
+              <a:t>Saving of game state in internal file </a:t>
+            </a:r>
+          </a:p>
+          <a:p>
+            <a:r>
+              <a:rPr lang="en-US" dirty="0" err="1"/>
+              <a:t>SunImageView</a:t>
+            </a:r>
+            <a:r>
+              <a:rPr lang="en-US" dirty="0"/>
+              <a:t> subclass of </a:t>
+            </a:r>
+            <a:r>
+              <a:rPr lang="en-US" i="1" dirty="0" err="1"/>
+              <a:t>ImageView</a:t>
+            </a:r>
+            <a:r>
+              <a:rPr lang="en-US" dirty="0"/>
+              <a:t> w/ </a:t>
+            </a:r>
+            <a:r>
+              <a:rPr lang="en-US" i="1" dirty="0" err="1"/>
+              <a:t>onDraw</a:t>
+            </a:r>
+            <a:r>
+              <a:rPr lang="en-US" dirty="0"/>
+              <a:t> to do text numbers over sun-tile graphic</a:t>
+            </a:r>
           </a:p>
         </p:txBody>
       </p:sp>

</xml_diff>